<commit_message>
präsentation done; next task: plan further development
</commit_message>
<xml_diff>
--- a/readme.pptx
+++ b/readme.pptx
@@ -14,6 +14,8 @@
     <p:sldId id="262" r:id="rId8"/>
     <p:sldId id="263" r:id="rId9"/>
     <p:sldId id="264" r:id="rId10"/>
+    <p:sldId id="265" r:id="rId11"/>
+    <p:sldId id="266" r:id="rId12"/>
   </p:sldIdLst>
   <p:sldSz cx="9144000" cy="5143500" type="screen16x9"/>
   <p:notesSz cx="6858000" cy="9144000"/>
@@ -3133,6 +3135,270 @@
 </p:sld>
 </file>
 
+<file path=ppt/slides/slide10.xml><?xml version="1.0" encoding="utf-8"?>
+<p:sld xmlns:a="http://schemas.openxmlformats.org/drawingml/2006/main" xmlns:r="http://schemas.openxmlformats.org/officeDocument/2006/relationships" xmlns:p="http://schemas.openxmlformats.org/presentationml/2006/main">
+  <p:cSld>
+    <p:spTree>
+      <p:nvGrpSpPr>
+        <p:cNvPr id="1" name=""/>
+        <p:cNvGrpSpPr/>
+        <p:nvPr/>
+      </p:nvGrpSpPr>
+      <p:grpSpPr>
+        <a:xfrm>
+          <a:off x="0" y="0"/>
+          <a:ext cx="0" cy="0"/>
+          <a:chOff x="0" y="0"/>
+          <a:chExt cx="0" cy="0"/>
+        </a:xfrm>
+      </p:grpSpPr>
+      <p:sp>
+        <p:nvSpPr>
+          <p:cNvPr id="2" name="Title 1"/>
+          <p:cNvSpPr>
+            <a:spLocks noGrp="1"/>
+          </p:cNvSpPr>
+          <p:nvPr>
+            <p:ph type="title"/>
+          </p:nvPr>
+        </p:nvSpPr>
+        <p:spPr/>
+        <p:txBody>
+          <a:bodyPr/>
+          <a:lstStyle/>
+          <a:p>
+            <a:pPr lvl="0" indent="0" marL="0">
+              <a:buNone/>
+            </a:pPr>
+            <a:r>
+              <a:rPr/>
+              <a:t>Future-Development</a:t>
+            </a:r>
+          </a:p>
+        </p:txBody>
+      </p:sp>
+      <p:sp>
+        <p:nvSpPr>
+          <p:cNvPr id="3" name="Content Placeholder 2"/>
+          <p:cNvSpPr>
+            <a:spLocks noGrp="1"/>
+          </p:cNvSpPr>
+          <p:nvPr>
+            <p:ph idx="1"/>
+          </p:nvPr>
+        </p:nvSpPr>
+        <p:spPr/>
+        <p:txBody>
+          <a:bodyPr/>
+          <a:lstStyle/>
+          <a:p>
+            <a:pPr lvl="0"/>
+            <a:r>
+              <a:rPr/>
+              <a:t>☐ Implement image-upload</a:t>
+            </a:r>
+          </a:p>
+          <a:p>
+            <a:pPr lvl="0"/>
+            <a:r>
+              <a:rPr/>
+              <a:t>☐ Solve crashing issue</a:t>
+            </a:r>
+          </a:p>
+          <a:p>
+            <a:pPr lvl="0"/>
+            <a:r>
+              <a:rPr/>
+              <a:t>☐ Refine deployment-strategy</a:t>
+            </a:r>
+          </a:p>
+          <a:p>
+            <a:pPr lvl="1"/>
+            <a:r>
+              <a:rPr/>
+              <a:t>Can’t currently deploy docker stack to webhost, works locally when building</a:t>
+            </a:r>
+          </a:p>
+          <a:p>
+            <a:pPr lvl="0"/>
+            <a:r>
+              <a:rPr/>
+              <a:t>☐ Add SSL-certificate</a:t>
+            </a:r>
+          </a:p>
+          <a:p>
+            <a:pPr lvl="0"/>
+            <a:r>
+              <a:rPr/>
+              <a:t>☐ Refine Docs</a:t>
+            </a:r>
+          </a:p>
+          <a:p>
+            <a:pPr lvl="1"/>
+            <a:r>
+              <a:rPr/>
+              <a:t>Documentation for administration of the site and database</a:t>
+            </a:r>
+          </a:p>
+        </p:txBody>
+      </p:sp>
+    </p:spTree>
+  </p:cSld>
+</p:sld>
+</file>
+
+<file path=ppt/slides/slide11.xml><?xml version="1.0" encoding="utf-8"?>
+<p:sld xmlns:a="http://schemas.openxmlformats.org/drawingml/2006/main" xmlns:r="http://schemas.openxmlformats.org/officeDocument/2006/relationships" xmlns:p="http://schemas.openxmlformats.org/presentationml/2006/main">
+  <p:cSld>
+    <p:spTree>
+      <p:nvGrpSpPr>
+        <p:cNvPr id="1" name=""/>
+        <p:cNvGrpSpPr/>
+        <p:nvPr/>
+      </p:nvGrpSpPr>
+      <p:grpSpPr>
+        <a:xfrm>
+          <a:off x="0" y="0"/>
+          <a:ext cx="0" cy="0"/>
+          <a:chOff x="0" y="0"/>
+          <a:chExt cx="0" cy="0"/>
+        </a:xfrm>
+      </p:grpSpPr>
+      <p:sp>
+        <p:nvSpPr>
+          <p:cNvPr id="2" name="Title 1"/>
+          <p:cNvSpPr>
+            <a:spLocks noGrp="1"/>
+          </p:cNvSpPr>
+          <p:nvPr>
+            <p:ph type="title"/>
+          </p:nvPr>
+        </p:nvSpPr>
+        <p:spPr/>
+        <p:txBody>
+          <a:bodyPr/>
+          <a:lstStyle/>
+          <a:p>
+            <a:pPr lvl="0" indent="0" marL="0">
+              <a:buNone/>
+            </a:pPr>
+            <a:r>
+              <a:rPr/>
+              <a:t>How to Participate in Development</a:t>
+            </a:r>
+          </a:p>
+        </p:txBody>
+      </p:sp>
+      <p:sp>
+        <p:nvSpPr>
+          <p:cNvPr id="3" name="Content Placeholder 2"/>
+          <p:cNvSpPr>
+            <a:spLocks noGrp="1"/>
+          </p:cNvSpPr>
+          <p:nvPr>
+            <p:ph idx="1"/>
+          </p:nvPr>
+        </p:nvSpPr>
+        <p:spPr/>
+        <p:txBody>
+          <a:bodyPr/>
+          <a:lstStyle/>
+          <a:p>
+            <a:pPr lvl="0" indent="-342900" marL="342900">
+              <a:buAutoNum type="arabicPeriod"/>
+            </a:pPr>
+            <a:r>
+              <a:rPr/>
+              <a:t>Fork this repository for yourself</a:t>
+            </a:r>
+          </a:p>
+          <a:p>
+            <a:pPr lvl="0" indent="-342900" marL="342900">
+              <a:buAutoNum type="arabicPeriod"/>
+            </a:pPr>
+            <a:r>
+              <a:rPr/>
+              <a:t>Clone your fork to your local machine</a:t>
+            </a:r>
+          </a:p>
+          <a:p>
+            <a:pPr lvl="0" indent="-342900" marL="342900">
+              <a:buAutoNum type="arabicPeriod"/>
+            </a:pPr>
+            <a:r>
+              <a:rPr/>
+              <a:t>Open the repository in vscode</a:t>
+            </a:r>
+          </a:p>
+          <a:p>
+            <a:pPr lvl="0" indent="-342900" marL="342900">
+              <a:buAutoNum type="arabicPeriod"/>
+            </a:pPr>
+            <a:r>
+              <a:rPr i="1"/>
+              <a:t>(optional)</a:t>
+            </a:r>
+            <a:r>
+              <a:rPr/>
+              <a:t> Open in devcontainer with the </a:t>
+            </a:r>
+            <a:r>
+              <a:rPr>
+                <a:hlinkClick r:id="rId2"/>
+                <a:latin typeface="Courier"/>
+              </a:rPr>
+              <a:t>remote container</a:t>
+            </a:r>
+            <a:r>
+              <a:rPr/>
+              <a:t> extension</a:t>
+            </a:r>
+          </a:p>
+          <a:p>
+            <a:pPr lvl="0" indent="0" marL="0">
+              <a:buNone/>
+            </a:pPr>
+            <a:r>
+              <a:rPr/>
+              <a:t>To debug inside the dev-container just make sure nodemon is running (should be default) and use the default debug config, which should automatically attach to nodemon.</a:t>
+            </a:r>
+          </a:p>
+          <a:p>
+            <a:pPr lvl="0" indent="0" marL="0">
+              <a:buNone/>
+            </a:pPr>
+            <a:r>
+              <a:rPr/>
+              <a:t>ToDo:</a:t>
+            </a:r>
+          </a:p>
+          <a:p>
+            <a:pPr lvl="0"/>
+            <a:r>
+              <a:rPr/>
+              <a:t>☐ Remove the start of nodemon from the devcontainer-setup –&gt; always showing </a:t>
+            </a:r>
+            <a:r>
+              <a:rPr>
+                <a:latin typeface="Courier"/>
+              </a:rPr>
+              <a:t>Configuring Dev Container...</a:t>
+            </a:r>
+          </a:p>
+          <a:p>
+            <a:pPr lvl="0"/>
+            <a:r>
+              <a:rPr/>
+              <a:t>☐ Fix vscode internal debugger not working when attaching –&gt; watch / callstack / breakpoints not working</a:t>
+            </a:r>
+          </a:p>
+        </p:txBody>
+      </p:sp>
+    </p:spTree>
+  </p:cSld>
+</p:sld>
+</file>
+
 <file path=ppt/slides/slide2.xml><?xml version="1.0" encoding="utf-8"?>
 <p:sld xmlns:a="http://schemas.openxmlformats.org/drawingml/2006/main" xmlns:r="http://schemas.openxmlformats.org/officeDocument/2006/relationships" xmlns:p="http://schemas.openxmlformats.org/presentationml/2006/main">
   <p:cSld>
@@ -3171,6 +3437,21 @@
             <a:r>
               <a:rPr/>
               <a:t>This project is for demo-purposes only, but if you find it usefull, you are free to use any code / documentation inside as permitted by the MIT-License.</a:t>
+            </a:r>
+          </a:p>
+          <a:p>
+            <a:pPr lvl="0" indent="0" marL="0">
+              <a:buNone/>
+            </a:pPr>
+            <a:r>
+              <a:rPr/>
+              <a:t>This idea is based on a video linked </a:t>
+            </a:r>
+            <a:r>
+              <a:rPr>
+                <a:hlinkClick r:id="rId2"/>
+              </a:rPr>
+              <a:t>here…</a:t>
             </a:r>
           </a:p>
         </p:txBody>
@@ -3274,19 +3555,10 @@
               <a:buAutoNum type="arabicPeriod"/>
             </a:pPr>
             <a:r>
-              <a:rPr/>
-              <a:t>Deployment Strategy</a:t>
-            </a:r>
-          </a:p>
-          <a:p>
-            <a:pPr lvl="0" indent="-342900" marL="342900">
-              <a:buAutoNum type="arabicPeriod"/>
-            </a:pPr>
-            <a:r>
               <a:rPr>
                 <a:hlinkClick r:id="rId5" action="ppaction://hlinksldjump"/>
               </a:rPr>
-              <a:t>Review</a:t>
+              <a:t>Deployment Strategy</a:t>
             </a:r>
           </a:p>
           <a:p>
@@ -3297,7 +3569,29 @@
               <a:rPr>
                 <a:hlinkClick r:id="rId6" action="ppaction://hlinksldjump"/>
               </a:rPr>
+              <a:t>Review</a:t>
+            </a:r>
+          </a:p>
+          <a:p>
+            <a:pPr lvl="0" indent="-342900" marL="342900">
+              <a:buAutoNum type="arabicPeriod"/>
+            </a:pPr>
+            <a:r>
+              <a:rPr>
+                <a:hlinkClick r:id="rId7" action="ppaction://hlinksldjump"/>
+              </a:rPr>
               <a:t>Plans for future development</a:t>
+            </a:r>
+          </a:p>
+          <a:p>
+            <a:pPr lvl="0" indent="-342900" marL="342900">
+              <a:buAutoNum type="arabicPeriod"/>
+            </a:pPr>
+            <a:r>
+              <a:rPr>
+                <a:hlinkClick r:id="rId8" action="ppaction://hlinksldjump"/>
+              </a:rPr>
+              <a:t>How to Participate in Development</a:t>
             </a:r>
           </a:p>
         </p:txBody>
@@ -4022,7 +4316,7 @@
             </a:pPr>
             <a:r>
               <a:rPr/>
-              <a:t>Review</a:t>
+              <a:t>Deployment-Strategy</a:t>
             </a:r>
           </a:p>
         </p:txBody>
@@ -4043,126 +4337,39 @@
           <a:lstStyle/>
           <a:p>
             <a:pPr lvl="0" indent="0" marL="0">
-              <a:spcBef>
-                <a:spcPts val="3000"/>
-              </a:spcBef>
-              <a:buNone/>
-            </a:pPr>
-            <a:r>
-              <a:rPr b="1"/>
-              <a:t>Current State</a:t>
-            </a:r>
-          </a:p>
-          <a:p>
-            <a:pPr lvl="0"/>
-            <a:r>
-              <a:rPr/>
-              <a:t>MVP functional :+1:</a:t>
-            </a:r>
-          </a:p>
-          <a:p>
-            <a:pPr lvl="0"/>
-            <a:r>
-              <a:rPr/>
-              <a:t>Images cause server to crash if not uploaded</a:t>
-            </a:r>
-          </a:p>
-          <a:p>
-            <a:pPr lvl="0"/>
-            <a:r>
-              <a:rPr/>
-              <a:t>Image-Upload feature still needs work</a:t>
-            </a:r>
-          </a:p>
-          <a:p>
-            <a:pPr lvl="0"/>
-            <a:r>
-              <a:rPr/>
-              <a:t>Modular approach makes incremental changes possible</a:t>
-            </a:r>
-          </a:p>
-          <a:p>
-            <a:pPr lvl="0" indent="0" marL="0">
-              <a:spcBef>
-                <a:spcPts val="3000"/>
-              </a:spcBef>
-              <a:buNone/>
-            </a:pPr>
-            <a:r>
-              <a:rPr b="1"/>
-              <a:t>Issues during development</a:t>
-            </a:r>
-          </a:p>
-          <a:p>
-            <a:pPr lvl="0" indent="0" marL="0">
-              <a:buNone/>
-            </a:pPr>
-            <a:r>
-              <a:rPr/>
-              <a:t>The following lists the most remarkable problems and how to avoid them for the next project:</a:t>
-            </a:r>
-          </a:p>
-          <a:p>
-            <a:pPr lvl="0" indent="0" marL="0">
-              <a:spcBef>
-                <a:spcPts val="3000"/>
-              </a:spcBef>
-              <a:buNone/>
-            </a:pPr>
-            <a:r>
-              <a:rPr b="1"/>
-              <a:t>Bad Time-Management</a:t>
-            </a:r>
-          </a:p>
-          <a:p>
-            <a:pPr lvl="0" indent="0" marL="0">
-              <a:buNone/>
-            </a:pPr>
-            <a:r>
-              <a:rPr/>
-              <a:t>Because of the number of frameworks used and trying to stay true to established conventions, alot of time went into researching optimal ways to solve these problems. This time, invested into research, in the end was missing for the documentation and the presentation for the customer.</a:t>
-            </a:r>
-          </a:p>
-          <a:p>
-            <a:pPr lvl="0" indent="0" marL="0">
-              <a:spcBef>
-                <a:spcPts val="3000"/>
-              </a:spcBef>
-              <a:buNone/>
-            </a:pPr>
-            <a:r>
-              <a:rPr b="1"/>
-              <a:t>EJS-Views not supporting blocks</a:t>
-            </a:r>
-          </a:p>
-          <a:p>
-            <a:pPr lvl="0" indent="0" marL="0">
-              <a:buNone/>
-            </a:pPr>
-            <a:r>
-              <a:rPr/>
-              <a:t>For this project, I decided to use ejs as the view-engine for express. Ejs is one of the oldest view-engines around and seemed like a good choice at first. But as I found out later, ejs doesn’t support “blocks” inside the templates. This means, we have to have two default templates instead of one. While this isn’t a major setback, it did support it in previous versions and cost me quite some time to figure out why it wasn’t working.</a:t>
-            </a:r>
-          </a:p>
-          <a:p>
-            <a:pPr lvl="0" indent="0" marL="0">
-              <a:spcBef>
-                <a:spcPts val="3000"/>
-              </a:spcBef>
-              <a:buNone/>
-            </a:pPr>
-            <a:r>
-              <a:rPr b="1"/>
-              <a:t>Docker(izing) the Application</a:t>
-            </a:r>
-          </a:p>
-          <a:p>
-            <a:pPr lvl="0" indent="0" marL="0">
-              <a:buNone/>
-            </a:pPr>
-            <a:r>
-              <a:rPr/>
-              <a:t>To make the deployment as easy as possible for the customer, I wanted to publish this webapp as a dockerimage and bundle it with the database-server inside a docker-stack. This theoretically makes the installation-process for the customer as simple as setting up a docker environment (which most companies already have) and execute:</a:t>
+              <a:buNone/>
+            </a:pPr>
+            <a:r>
+              <a:rPr/>
+              <a:t>For easy deployment on the customers server, I decided to package my application as a docker-image. Docker images are self-contained environments for applications. They contain the complete application and all dependencies already built. This way, all the customer has to do, is:</a:t>
+            </a:r>
+          </a:p>
+          <a:p>
+            <a:pPr lvl="0" indent="-342900" marL="342900">
+              <a:buAutoNum type="arabicPeriod"/>
+            </a:pPr>
+            <a:r>
+              <a:rPr/>
+              <a:t>Setup a server with </a:t>
+            </a:r>
+            <a:r>
+              <a:rPr>
+                <a:hlinkClick r:id="rId2"/>
+              </a:rPr>
+              <a:t>docker</a:t>
+            </a:r>
+            <a:r>
+              <a:rPr/>
+              <a:t> installed</a:t>
+            </a:r>
+          </a:p>
+          <a:p>
+            <a:pPr lvl="0" indent="-342900" marL="342900">
+              <a:buAutoNum type="arabicPeriod"/>
+            </a:pPr>
+            <a:r>
+              <a:rPr/>
+              <a:t>Clone the repository and build the image from source using:</a:t>
             </a:r>
           </a:p>
           <a:p>
@@ -4183,6 +4390,36 @@
               <a:rPr>
                 <a:latin typeface="Courier"/>
               </a:rPr>
+              <a:t>docker compose build</a:t>
+            </a:r>
+          </a:p>
+          <a:p>
+            <a:pPr lvl="0" indent="0" marL="0">
+              <a:buNone/>
+            </a:pPr>
+            <a:r>
+              <a:rPr/>
+              <a:t>And then start-up the stack</a:t>
+            </a:r>
+          </a:p>
+          <a:p>
+            <a:pPr lvl="0" indent="0">
+              <a:buNone/>
+            </a:pPr>
+            <a:r>
+              <a:rPr i="1">
+                <a:solidFill>
+                  <a:srgbClr val="60A0B0"/>
+                </a:solidFill>
+                <a:latin typeface="Courier"/>
+              </a:rPr>
+              <a:t>#!/bin/bash</a:t>
+            </a:r>
+            <a:br/>
+            <a:r>
+              <a:rPr>
+                <a:latin typeface="Courier"/>
+              </a:rPr>
               <a:t>docker compose up </a:t>
             </a:r>
             <a:r>
@@ -4201,7 +4438,26 @@
             </a:pPr>
             <a:r>
               <a:rPr/>
-              <a:t>The problem I had with this strategy was the database. MongoDB as a container doesn’t seem to work with particular cpu’s… incidentally including the one installed inside my rented vps-server. So I couldn’t get the database working on my remote-server. Thankfully this doesn’t prevent me from starting the server locally, but this highlights other issues i need to resolve before publishing the application.</a:t>
+              <a:t>The </a:t>
+            </a:r>
+            <a:r>
+              <a:rPr>
+                <a:latin typeface="Courier"/>
+              </a:rPr>
+              <a:t>-d</a:t>
+            </a:r>
+            <a:r>
+              <a:rPr/>
+              <a:t> optional flag starts the all containers, including the app without attaching the process to the running terminal.</a:t>
+            </a:r>
+          </a:p>
+          <a:p>
+            <a:pPr lvl="0" indent="-342900" marL="342900">
+              <a:buAutoNum startAt="3" type="arabicPeriod"/>
+            </a:pPr>
+            <a:r>
+              <a:rPr/>
+              <a:t>Verify that everything is working by going to localhost:7777 and adding one article</a:t>
             </a:r>
           </a:p>
         </p:txBody>
@@ -4248,7 +4504,7 @@
             </a:pPr>
             <a:r>
               <a:rPr/>
-              <a:t>Summary</a:t>
+              <a:t>Review</a:t>
             </a:r>
           </a:p>
         </p:txBody>
@@ -4269,11 +4525,165 @@
           <a:lstStyle/>
           <a:p>
             <a:pPr lvl="0" indent="0" marL="0">
-              <a:buNone/>
-            </a:pPr>
-            <a:r>
-              <a:rPr/>
-              <a:t>This whole project was a lot of fun overall. Trying out a few new things, getting comfortable with technology I am already using and learning new ways to accomplish my goals. However it also highlighted many things I didn’t plan for. I wanted to document these issues I had, to hopefully be more wary in the future and have a solution for them.</a:t>
+              <a:spcBef>
+                <a:spcPts val="3000"/>
+              </a:spcBef>
+              <a:buNone/>
+            </a:pPr>
+            <a:r>
+              <a:rPr b="1"/>
+              <a:t>Current State</a:t>
+            </a:r>
+          </a:p>
+          <a:p>
+            <a:pPr lvl="0"/>
+            <a:r>
+              <a:rPr/>
+              <a:t>MVP functional :+1:</a:t>
+            </a:r>
+          </a:p>
+          <a:p>
+            <a:pPr lvl="0"/>
+            <a:r>
+              <a:rPr/>
+              <a:t>Images cause server to crash if not uploaded</a:t>
+            </a:r>
+          </a:p>
+          <a:p>
+            <a:pPr lvl="0"/>
+            <a:r>
+              <a:rPr/>
+              <a:t>Image-Upload feature still needs work</a:t>
+            </a:r>
+          </a:p>
+          <a:p>
+            <a:pPr lvl="0"/>
+            <a:r>
+              <a:rPr/>
+              <a:t>Modular approach makes incremental changes possible</a:t>
+            </a:r>
+          </a:p>
+          <a:p>
+            <a:pPr lvl="0" indent="0" marL="0">
+              <a:spcBef>
+                <a:spcPts val="3000"/>
+              </a:spcBef>
+              <a:buNone/>
+            </a:pPr>
+            <a:r>
+              <a:rPr b="1"/>
+              <a:t>Issues during development</a:t>
+            </a:r>
+          </a:p>
+          <a:p>
+            <a:pPr lvl="0" indent="0" marL="0">
+              <a:buNone/>
+            </a:pPr>
+            <a:r>
+              <a:rPr/>
+              <a:t>The following lists the most remarkable problems and how to avoid them for the next project:</a:t>
+            </a:r>
+          </a:p>
+          <a:p>
+            <a:pPr lvl="0" indent="0" marL="0">
+              <a:spcBef>
+                <a:spcPts val="3000"/>
+              </a:spcBef>
+              <a:buNone/>
+            </a:pPr>
+            <a:r>
+              <a:rPr b="1"/>
+              <a:t>Bad Time-Management</a:t>
+            </a:r>
+          </a:p>
+          <a:p>
+            <a:pPr lvl="0" indent="0" marL="0">
+              <a:buNone/>
+            </a:pPr>
+            <a:r>
+              <a:rPr/>
+              <a:t>Because of the number of frameworks used and trying to stay true to established conventions, alot of time went into researching optimal ways to solve these problems. This time, invested into research, in the end was missing for the documentation and the presentation for the customer.</a:t>
+            </a:r>
+          </a:p>
+          <a:p>
+            <a:pPr lvl="0" indent="0" marL="0">
+              <a:spcBef>
+                <a:spcPts val="3000"/>
+              </a:spcBef>
+              <a:buNone/>
+            </a:pPr>
+            <a:r>
+              <a:rPr b="1"/>
+              <a:t>EJS-Views not supporting blocks</a:t>
+            </a:r>
+          </a:p>
+          <a:p>
+            <a:pPr lvl="0" indent="0" marL="0">
+              <a:buNone/>
+            </a:pPr>
+            <a:r>
+              <a:rPr/>
+              <a:t>For this project, I decided to use ejs as the view-engine for express. Ejs is one of the oldest view-engines around and seemed like a good choice at first. But as I found out later, ejs doesn’t support “blocks” inside the templates. This means, we have to have two default templates instead of one. While this isn’t a major setback, it did support it in previous versions and cost me quite some time to figure out why it wasn’t working.</a:t>
+            </a:r>
+          </a:p>
+          <a:p>
+            <a:pPr lvl="0" indent="0" marL="0">
+              <a:spcBef>
+                <a:spcPts val="3000"/>
+              </a:spcBef>
+              <a:buNone/>
+            </a:pPr>
+            <a:r>
+              <a:rPr b="1"/>
+              <a:t>Docker(izing) the Application</a:t>
+            </a:r>
+          </a:p>
+          <a:p>
+            <a:pPr lvl="0" indent="0" marL="0">
+              <a:buNone/>
+            </a:pPr>
+            <a:r>
+              <a:rPr/>
+              <a:t>To make the deployment as easy as possible for the customer, I wanted to publish this webapp as a dockerimage and bundle it with the database-server inside a docker-stack. This theoretically makes the installation-process for the customer as simple as setting up a docker environment (which most companies already have) and execute:</a:t>
+            </a:r>
+          </a:p>
+          <a:p>
+            <a:pPr lvl="0" indent="0">
+              <a:buNone/>
+            </a:pPr>
+            <a:r>
+              <a:rPr i="1">
+                <a:solidFill>
+                  <a:srgbClr val="60A0B0"/>
+                </a:solidFill>
+                <a:latin typeface="Courier"/>
+              </a:rPr>
+              <a:t>#!/bin/bash</a:t>
+            </a:r>
+            <a:br/>
+            <a:r>
+              <a:rPr>
+                <a:latin typeface="Courier"/>
+              </a:rPr>
+              <a:t>docker compose up </a:t>
+            </a:r>
+            <a:r>
+              <a:rPr>
+                <a:solidFill>
+                  <a:srgbClr val="7D9029"/>
+                </a:solidFill>
+                <a:latin typeface="Courier"/>
+              </a:rPr>
+              <a:t>-d</a:t>
+            </a:r>
+          </a:p>
+          <a:p>
+            <a:pPr lvl="0" indent="0" marL="0">
+              <a:buNone/>
+            </a:pPr>
+            <a:r>
+              <a:rPr/>
+              <a:t>The problem I had with this strategy was the database. MongoDB as a container doesn’t seem to work with particular cpu’s… incidentally including the one installed inside my rented vps-server. So I couldn’t get the database working on my remote-server. Thankfully this doesn’t prevent me from starting the server locally, but this highlights other issues i need to resolve before publishing the application.</a:t>
             </a:r>
           </a:p>
         </p:txBody>
@@ -4320,7 +4730,7 @@
             </a:pPr>
             <a:r>
               <a:rPr/>
-              <a:t>Future-Development</a:t>
+              <a:t>Summary</a:t>
             </a:r>
           </a:p>
         </p:txBody>
@@ -4340,52 +4750,12 @@
           <a:bodyPr/>
           <a:lstStyle/>
           <a:p>
-            <a:pPr lvl="0"/>
-            <a:r>
-              <a:rPr/>
-              <a:t>☐ Implement image-upload</a:t>
-            </a:r>
-          </a:p>
-          <a:p>
-            <a:pPr lvl="0"/>
-            <a:r>
-              <a:rPr/>
-              <a:t>☐ Solve crashing issue</a:t>
-            </a:r>
-          </a:p>
-          <a:p>
-            <a:pPr lvl="0"/>
-            <a:r>
-              <a:rPr/>
-              <a:t>☐ Refine deployment-strategy</a:t>
-            </a:r>
-          </a:p>
-          <a:p>
-            <a:pPr lvl="1"/>
-            <a:r>
-              <a:rPr/>
-              <a:t>Can’t currently deploy docker stack to webhost, works locally when building</a:t>
-            </a:r>
-          </a:p>
-          <a:p>
-            <a:pPr lvl="0"/>
-            <a:r>
-              <a:rPr/>
-              <a:t>☐ Add SSL-certificate</a:t>
-            </a:r>
-          </a:p>
-          <a:p>
-            <a:pPr lvl="0"/>
-            <a:r>
-              <a:rPr/>
-              <a:t>☐ Refine Docs</a:t>
-            </a:r>
-          </a:p>
-          <a:p>
-            <a:pPr lvl="1"/>
-            <a:r>
-              <a:rPr/>
-              <a:t>Documentation for administration of the site and database</a:t>
+            <a:pPr lvl="0" indent="0" marL="0">
+              <a:buNone/>
+            </a:pPr>
+            <a:r>
+              <a:rPr/>
+              <a:t>This whole project was a lot of fun overall. Trying out a few new things, getting comfortable with technology I am already using and learning new ways to accomplish my goals. However it also highlighted many things I didn’t plan for. I wanted to document these issues I had, to hopefully be more wary in the future and have a solution for them.</a:t>
             </a:r>
           </a:p>
         </p:txBody>

</xml_diff>